<commit_message>
Added notes and adjusted slide length
</commit_message>
<xml_diff>
--- a/AdversarialBiasPresentation Steven+Solange+Nicole.pptx
+++ b/AdversarialBiasPresentation Steven+Solange+Nicole.pptx
@@ -5353,7 +5353,7 @@
           <a:p>
             <a:fld id="{935336F5-A68D-9A4A-83AB-B8CD6FA5C732}" type="datetimeFigureOut">
               <a:rPr lang="en-US" smtClean="0"/>
-              <a:t>7/7/2020</a:t>
+              <a:t>7/8/2020</a:t>
             </a:fld>
             <a:endParaRPr lang="en-US"/>
           </a:p>
@@ -5748,16 +5748,97 @@
           <a:bodyPr/>
           <a:lstStyle/>
           <a:p>
-            <a:r>
-              <a:rPr lang="en-US" dirty="0"/>
-              <a:t>IBM Synthesized dataset</a:t>
-            </a:r>
-          </a:p>
-          <a:p>
-            <a:r>
-              <a:rPr lang="en-US" dirty="0"/>
-              <a:t>1470 observations </a:t>
-            </a:r>
+            <a:pPr marL="171450" indent="-171450">
+              <a:buFont typeface="Arial" panose="020B0604020202020204" pitchFamily="34" charset="0"/>
+              <a:buChar char="•"/>
+            </a:pPr>
+            <a:r>
+              <a:rPr lang="en-US" sz="1200" kern="1200" dirty="0">
+                <a:solidFill>
+                  <a:schemeClr val="tx1"/>
+                </a:solidFill>
+                <a:effectLst/>
+                <a:latin typeface="+mn-lt"/>
+                <a:ea typeface="+mn-ea"/>
+                <a:cs typeface="+mn-cs"/>
+              </a:rPr>
+              <a:t>We got our inspiration from the GANS Framework</a:t>
+            </a:r>
+          </a:p>
+          <a:p>
+            <a:pPr marL="171450" indent="-171450">
+              <a:buFont typeface="Arial" panose="020B0604020202020204" pitchFamily="34" charset="0"/>
+              <a:buChar char="•"/>
+            </a:pPr>
+            <a:r>
+              <a:rPr lang="en-US" sz="1200" kern="1200" dirty="0">
+                <a:solidFill>
+                  <a:schemeClr val="tx1"/>
+                </a:solidFill>
+                <a:effectLst/>
+                <a:latin typeface="+mn-lt"/>
+                <a:ea typeface="+mn-ea"/>
+                <a:cs typeface="+mn-cs"/>
+              </a:rPr>
+              <a:t>You have two algorithms competing against each other trying to minimize some loss function </a:t>
+            </a:r>
+          </a:p>
+          <a:p>
+            <a:pPr marL="171450" indent="-171450">
+              <a:buFont typeface="Arial" panose="020B0604020202020204" pitchFamily="34" charset="0"/>
+              <a:buChar char="•"/>
+            </a:pPr>
+            <a:r>
+              <a:rPr lang="en-US" sz="1200" kern="1200" dirty="0">
+                <a:solidFill>
+                  <a:schemeClr val="tx1"/>
+                </a:solidFill>
+                <a:effectLst/>
+                <a:latin typeface="+mn-lt"/>
+                <a:ea typeface="+mn-ea"/>
+                <a:cs typeface="+mn-cs"/>
+              </a:rPr>
+              <a:t>In the first image you have real data passed to the discriminator (agl1) to predict if it is real or not.</a:t>
+            </a:r>
+          </a:p>
+          <a:p>
+            <a:pPr marL="171450" indent="-171450">
+              <a:buFont typeface="Arial" panose="020B0604020202020204" pitchFamily="34" charset="0"/>
+              <a:buChar char="•"/>
+            </a:pPr>
+            <a:r>
+              <a:rPr lang="en-US" sz="1200" kern="1200" dirty="0">
+                <a:solidFill>
+                  <a:schemeClr val="tx1"/>
+                </a:solidFill>
+                <a:effectLst/>
+                <a:latin typeface="+mn-lt"/>
+                <a:ea typeface="+mn-ea"/>
+                <a:cs typeface="+mn-cs"/>
+              </a:rPr>
+              <a:t>In the second you have the generator taking noise and transforming it in its network to try and trick the discriminator. </a:t>
+            </a:r>
+          </a:p>
+          <a:p>
+            <a:pPr marL="171450" indent="-171450">
+              <a:buFont typeface="Arial" panose="020B0604020202020204" pitchFamily="34" charset="0"/>
+              <a:buChar char="•"/>
+            </a:pPr>
+            <a:r>
+              <a:rPr lang="en-US" sz="1200" kern="1200" dirty="0">
+                <a:solidFill>
+                  <a:schemeClr val="tx1"/>
+                </a:solidFill>
+                <a:effectLst/>
+                <a:latin typeface="+mn-lt"/>
+                <a:ea typeface="+mn-ea"/>
+                <a:cs typeface="+mn-cs"/>
+              </a:rPr>
+              <a:t>Depending on what network was wrong, that is the one that will be updated. </a:t>
+            </a:r>
+          </a:p>
+          <a:p>
+            <a:endParaRPr lang="en-US" dirty="0"/>
           </a:p>
         </p:txBody>
       </p:sp>
@@ -5778,6 +5859,129 @@
           <a:p>
             <a:fld id="{BAA9633A-392A-4347-9D1C-FF5FFE9476B1}" type="slidenum">
               <a:rPr lang="en-US" smtClean="0"/>
+              <a:t>8</a:t>
+            </a:fld>
+            <a:endParaRPr lang="en-US"/>
+          </a:p>
+        </p:txBody>
+      </p:sp>
+    </p:spTree>
+    <p:extLst>
+      <p:ext uri="{BB962C8B-B14F-4D97-AF65-F5344CB8AC3E}">
+        <p14:creationId xmlns:p14="http://schemas.microsoft.com/office/powerpoint/2010/main" val="2740084309"/>
+      </p:ext>
+    </p:extLst>
+  </p:cSld>
+  <p:clrMapOvr>
+    <a:masterClrMapping/>
+  </p:clrMapOvr>
+</p:notes>
+</file>
+
+<file path=ppt/notesSlides/notesSlide3.xml><?xml version="1.0" encoding="utf-8"?>
+<p:notes xmlns:a="http://schemas.openxmlformats.org/drawingml/2006/main" xmlns:r="http://schemas.openxmlformats.org/officeDocument/2006/relationships" xmlns:p="http://schemas.openxmlformats.org/presentationml/2006/main">
+  <p:cSld>
+    <p:spTree>
+      <p:nvGrpSpPr>
+        <p:cNvPr id="1" name=""/>
+        <p:cNvGrpSpPr/>
+        <p:nvPr/>
+      </p:nvGrpSpPr>
+      <p:grpSpPr>
+        <a:xfrm>
+          <a:off x="0" y="0"/>
+          <a:ext cx="0" cy="0"/>
+          <a:chOff x="0" y="0"/>
+          <a:chExt cx="0" cy="0"/>
+        </a:xfrm>
+      </p:grpSpPr>
+      <p:sp>
+        <p:nvSpPr>
+          <p:cNvPr id="2" name="Slide Image Placeholder 1"/>
+          <p:cNvSpPr>
+            <a:spLocks noGrp="1" noRot="1" noChangeAspect="1"/>
+          </p:cNvSpPr>
+          <p:nvPr>
+            <p:ph type="sldImg"/>
+          </p:nvPr>
+        </p:nvSpPr>
+        <p:spPr/>
+      </p:sp>
+      <p:sp>
+        <p:nvSpPr>
+          <p:cNvPr id="3" name="Notes Placeholder 2"/>
+          <p:cNvSpPr>
+            <a:spLocks noGrp="1"/>
+          </p:cNvSpPr>
+          <p:nvPr>
+            <p:ph type="body" idx="1"/>
+          </p:nvPr>
+        </p:nvSpPr>
+        <p:spPr/>
+        <p:txBody>
+          <a:bodyPr/>
+          <a:lstStyle/>
+          <a:p>
+            <a:r>
+              <a:rPr lang="en-US" sz="1200" kern="1200" dirty="0">
+                <a:solidFill>
+                  <a:schemeClr val="tx1"/>
+                </a:solidFill>
+                <a:effectLst/>
+                <a:latin typeface="+mn-lt"/>
+                <a:ea typeface="+mn-ea"/>
+                <a:cs typeface="+mn-cs"/>
+              </a:rPr>
+              <a:t>We used the synthetic IBM Attrition data for our experiment. </a:t>
+            </a:r>
+          </a:p>
+          <a:p>
+            <a:r>
+              <a:rPr lang="en-US" sz="1200" kern="1200" dirty="0">
+                <a:solidFill>
+                  <a:schemeClr val="tx1"/>
+                </a:solidFill>
+                <a:effectLst/>
+                <a:latin typeface="+mn-lt"/>
+                <a:ea typeface="+mn-ea"/>
+                <a:cs typeface="+mn-cs"/>
+              </a:rPr>
+              <a:t>As you can see the data is unbalanced with yellow = they left. </a:t>
+            </a:r>
+          </a:p>
+          <a:p>
+            <a:r>
+              <a:rPr lang="en-US" sz="1200" kern="1200" dirty="0">
+                <a:solidFill>
+                  <a:schemeClr val="tx1"/>
+                </a:solidFill>
+                <a:effectLst/>
+                <a:latin typeface="+mn-lt"/>
+                <a:ea typeface="+mn-ea"/>
+                <a:cs typeface="+mn-cs"/>
+              </a:rPr>
+              <a:t>The younger Age groups have a greater percentage of attrition.  </a:t>
+            </a:r>
+          </a:p>
+        </p:txBody>
+      </p:sp>
+      <p:sp>
+        <p:nvSpPr>
+          <p:cNvPr id="4" name="Slide Number Placeholder 3"/>
+          <p:cNvSpPr>
+            <a:spLocks noGrp="1"/>
+          </p:cNvSpPr>
+          <p:nvPr>
+            <p:ph type="sldNum" sz="quarter" idx="5"/>
+          </p:nvPr>
+        </p:nvSpPr>
+        <p:spPr/>
+        <p:txBody>
+          <a:bodyPr/>
+          <a:lstStyle/>
+          <a:p>
+            <a:fld id="{BAA9633A-392A-4347-9D1C-FF5FFE9476B1}" type="slidenum">
+              <a:rPr lang="en-US" smtClean="0"/>
               <a:t>11</a:t>
             </a:fld>
             <a:endParaRPr lang="en-US"/>
@@ -5788,6 +5992,369 @@
     <p:extLst>
       <p:ext uri="{BB962C8B-B14F-4D97-AF65-F5344CB8AC3E}">
         <p14:creationId xmlns:p14="http://schemas.microsoft.com/office/powerpoint/2010/main" val="582835802"/>
+      </p:ext>
+    </p:extLst>
+  </p:cSld>
+  <p:clrMapOvr>
+    <a:masterClrMapping/>
+  </p:clrMapOvr>
+</p:notes>
+</file>
+
+<file path=ppt/notesSlides/notesSlide4.xml><?xml version="1.0" encoding="utf-8"?>
+<p:notes xmlns:a="http://schemas.openxmlformats.org/drawingml/2006/main" xmlns:r="http://schemas.openxmlformats.org/officeDocument/2006/relationships" xmlns:p="http://schemas.openxmlformats.org/presentationml/2006/main">
+  <p:cSld>
+    <p:spTree>
+      <p:nvGrpSpPr>
+        <p:cNvPr id="1" name=""/>
+        <p:cNvGrpSpPr/>
+        <p:nvPr/>
+      </p:nvGrpSpPr>
+      <p:grpSpPr>
+        <a:xfrm>
+          <a:off x="0" y="0"/>
+          <a:ext cx="0" cy="0"/>
+          <a:chOff x="0" y="0"/>
+          <a:chExt cx="0" cy="0"/>
+        </a:xfrm>
+      </p:grpSpPr>
+      <p:sp>
+        <p:nvSpPr>
+          <p:cNvPr id="2" name="Slide Image Placeholder 1"/>
+          <p:cNvSpPr>
+            <a:spLocks noGrp="1" noRot="1" noChangeAspect="1"/>
+          </p:cNvSpPr>
+          <p:nvPr>
+            <p:ph type="sldImg"/>
+          </p:nvPr>
+        </p:nvSpPr>
+        <p:spPr/>
+      </p:sp>
+      <p:sp>
+        <p:nvSpPr>
+          <p:cNvPr id="3" name="Notes Placeholder 2"/>
+          <p:cNvSpPr>
+            <a:spLocks noGrp="1"/>
+          </p:cNvSpPr>
+          <p:nvPr>
+            <p:ph type="body" idx="1"/>
+          </p:nvPr>
+        </p:nvSpPr>
+        <p:spPr/>
+        <p:txBody>
+          <a:bodyPr/>
+          <a:lstStyle/>
+          <a:p>
+            <a:pPr marL="171450" indent="-171450">
+              <a:buFont typeface="Arial" panose="020B0604020202020204" pitchFamily="34" charset="0"/>
+              <a:buChar char="•"/>
+            </a:pPr>
+            <a:r>
+              <a:rPr lang="en-US" sz="1200" kern="1200" dirty="0">
+                <a:solidFill>
+                  <a:schemeClr val="tx1"/>
+                </a:solidFill>
+                <a:effectLst/>
+                <a:latin typeface="+mn-lt"/>
+                <a:ea typeface="+mn-ea"/>
+                <a:cs typeface="+mn-cs"/>
+              </a:rPr>
+              <a:t>Age is a protected attribute and we do not want age to influence the outcome.</a:t>
+            </a:r>
+          </a:p>
+          <a:p>
+            <a:pPr marL="171450" indent="-171450">
+              <a:buFont typeface="Arial" panose="020B0604020202020204" pitchFamily="34" charset="0"/>
+              <a:buChar char="•"/>
+            </a:pPr>
+            <a:r>
+              <a:rPr lang="en-US" sz="1200" kern="1200" dirty="0">
+                <a:solidFill>
+                  <a:schemeClr val="tx1"/>
+                </a:solidFill>
+                <a:effectLst/>
+                <a:latin typeface="+mn-lt"/>
+                <a:ea typeface="+mn-ea"/>
+                <a:cs typeface="+mn-cs"/>
+              </a:rPr>
+              <a:t>Most the time the protected attributes are just dropped, but other variables could be used as a substitute or is correlated with the protected attribute. </a:t>
+            </a:r>
+          </a:p>
+          <a:p>
+            <a:pPr marL="171450" indent="-171450">
+              <a:buFont typeface="Arial" panose="020B0604020202020204" pitchFamily="34" charset="0"/>
+              <a:buChar char="•"/>
+            </a:pPr>
+            <a:r>
+              <a:rPr lang="en-US" sz="1200" kern="1200" dirty="0">
+                <a:solidFill>
+                  <a:schemeClr val="tx1"/>
+                </a:solidFill>
+                <a:effectLst/>
+                <a:latin typeface="+mn-lt"/>
+                <a:ea typeface="+mn-ea"/>
+                <a:cs typeface="+mn-cs"/>
+              </a:rPr>
+              <a:t>For example, years worked at the company </a:t>
+            </a:r>
+          </a:p>
+          <a:p>
+            <a:pPr marL="171450" indent="-171450">
+              <a:buFont typeface="Arial" panose="020B0604020202020204" pitchFamily="34" charset="0"/>
+              <a:buChar char="•"/>
+            </a:pPr>
+            <a:r>
+              <a:rPr lang="en-US" sz="1200" kern="1200" dirty="0">
+                <a:solidFill>
+                  <a:schemeClr val="tx1"/>
+                </a:solidFill>
+                <a:effectLst/>
+                <a:latin typeface="+mn-lt"/>
+                <a:ea typeface="+mn-ea"/>
+                <a:cs typeface="+mn-cs"/>
+              </a:rPr>
+              <a:t>Our goal is to achieve or get closer to Demographic Parity by distributing accuracy across the age groups. </a:t>
+            </a:r>
+          </a:p>
+          <a:p>
+            <a:endParaRPr lang="en-US" dirty="0"/>
+          </a:p>
+        </p:txBody>
+      </p:sp>
+      <p:sp>
+        <p:nvSpPr>
+          <p:cNvPr id="4" name="Slide Number Placeholder 3"/>
+          <p:cNvSpPr>
+            <a:spLocks noGrp="1"/>
+          </p:cNvSpPr>
+          <p:nvPr>
+            <p:ph type="sldNum" sz="quarter" idx="5"/>
+          </p:nvPr>
+        </p:nvSpPr>
+        <p:spPr/>
+        <p:txBody>
+          <a:bodyPr/>
+          <a:lstStyle/>
+          <a:p>
+            <a:fld id="{BAA9633A-392A-4347-9D1C-FF5FFE9476B1}" type="slidenum">
+              <a:rPr lang="en-US" smtClean="0"/>
+              <a:t>12</a:t>
+            </a:fld>
+            <a:endParaRPr lang="en-US"/>
+          </a:p>
+        </p:txBody>
+      </p:sp>
+    </p:spTree>
+    <p:extLst>
+      <p:ext uri="{BB962C8B-B14F-4D97-AF65-F5344CB8AC3E}">
+        <p14:creationId xmlns:p14="http://schemas.microsoft.com/office/powerpoint/2010/main" val="3021403496"/>
+      </p:ext>
+    </p:extLst>
+  </p:cSld>
+  <p:clrMapOvr>
+    <a:masterClrMapping/>
+  </p:clrMapOvr>
+</p:notes>
+</file>
+
+<file path=ppt/notesSlides/notesSlide5.xml><?xml version="1.0" encoding="utf-8"?>
+<p:notes xmlns:a="http://schemas.openxmlformats.org/drawingml/2006/main" xmlns:r="http://schemas.openxmlformats.org/officeDocument/2006/relationships" xmlns:p="http://schemas.openxmlformats.org/presentationml/2006/main">
+  <p:cSld>
+    <p:spTree>
+      <p:nvGrpSpPr>
+        <p:cNvPr id="1" name=""/>
+        <p:cNvGrpSpPr/>
+        <p:nvPr/>
+      </p:nvGrpSpPr>
+      <p:grpSpPr>
+        <a:xfrm>
+          <a:off x="0" y="0"/>
+          <a:ext cx="0" cy="0"/>
+          <a:chOff x="0" y="0"/>
+          <a:chExt cx="0" cy="0"/>
+        </a:xfrm>
+      </p:grpSpPr>
+      <p:sp>
+        <p:nvSpPr>
+          <p:cNvPr id="2" name="Slide Image Placeholder 1"/>
+          <p:cNvSpPr>
+            <a:spLocks noGrp="1" noRot="1" noChangeAspect="1"/>
+          </p:cNvSpPr>
+          <p:nvPr>
+            <p:ph type="sldImg"/>
+          </p:nvPr>
+        </p:nvSpPr>
+        <p:spPr/>
+      </p:sp>
+      <p:sp>
+        <p:nvSpPr>
+          <p:cNvPr id="3" name="Notes Placeholder 2"/>
+          <p:cNvSpPr>
+            <a:spLocks noGrp="1"/>
+          </p:cNvSpPr>
+          <p:nvPr>
+            <p:ph type="body" idx="1"/>
+          </p:nvPr>
+        </p:nvSpPr>
+        <p:spPr/>
+        <p:txBody>
+          <a:bodyPr/>
+          <a:lstStyle/>
+          <a:p>
+            <a:pPr marL="171450" indent="-171450">
+              <a:buFont typeface="Arial" panose="020B0604020202020204" pitchFamily="34" charset="0"/>
+              <a:buChar char="•"/>
+            </a:pPr>
+            <a:r>
+              <a:rPr lang="en-US" sz="1200" kern="1200" dirty="0">
+                <a:solidFill>
+                  <a:schemeClr val="tx1"/>
+                </a:solidFill>
+                <a:effectLst/>
+                <a:latin typeface="+mn-lt"/>
+                <a:ea typeface="+mn-ea"/>
+                <a:cs typeface="+mn-cs"/>
+              </a:rPr>
+              <a:t>We start with a baseline to see how close we are to demographic parity.  </a:t>
+            </a:r>
+          </a:p>
+          <a:p>
+            <a:pPr marL="171450" indent="-171450">
+              <a:buFont typeface="Arial" panose="020B0604020202020204" pitchFamily="34" charset="0"/>
+              <a:buChar char="•"/>
+            </a:pPr>
+            <a:r>
+              <a:rPr lang="en-US" sz="1200" kern="1200" dirty="0">
+                <a:solidFill>
+                  <a:schemeClr val="tx1"/>
+                </a:solidFill>
+                <a:effectLst/>
+                <a:latin typeface="+mn-lt"/>
+                <a:ea typeface="+mn-ea"/>
+                <a:cs typeface="+mn-cs"/>
+              </a:rPr>
+              <a:t>We created a simple neural net  in the fashion of a logistic regression model. The idea is not to build the most accurate model but show that an adversarial can remove bias. </a:t>
+            </a:r>
+          </a:p>
+          <a:p>
+            <a:pPr marL="171450" indent="-171450">
+              <a:buFont typeface="Arial" panose="020B0604020202020204" pitchFamily="34" charset="0"/>
+              <a:buChar char="•"/>
+            </a:pPr>
+            <a:endParaRPr lang="en-US" sz="1200" kern="1200" dirty="0">
+              <a:solidFill>
+                <a:schemeClr val="tx1"/>
+              </a:solidFill>
+              <a:effectLst/>
+              <a:latin typeface="+mn-lt"/>
+              <a:ea typeface="+mn-ea"/>
+              <a:cs typeface="+mn-cs"/>
+            </a:endParaRPr>
+          </a:p>
+          <a:p>
+            <a:pPr marL="171450" indent="-171450">
+              <a:buFont typeface="Arial" panose="020B0604020202020204" pitchFamily="34" charset="0"/>
+              <a:buChar char="•"/>
+            </a:pPr>
+            <a:r>
+              <a:rPr lang="en-US" sz="1200" kern="1200" dirty="0">
+                <a:solidFill>
+                  <a:schemeClr val="tx1"/>
+                </a:solidFill>
+                <a:effectLst/>
+                <a:latin typeface="+mn-lt"/>
+                <a:ea typeface="+mn-ea"/>
+                <a:cs typeface="+mn-cs"/>
+              </a:rPr>
+              <a:t>The adversarial framework adds in our adversarial model that tries to predict age (our protected variable).</a:t>
+            </a:r>
+          </a:p>
+          <a:p>
+            <a:pPr marL="171450" indent="-171450">
+              <a:buFont typeface="Arial" panose="020B0604020202020204" pitchFamily="34" charset="0"/>
+              <a:buChar char="•"/>
+            </a:pPr>
+            <a:r>
+              <a:rPr lang="en-US" sz="1200" kern="1200" dirty="0">
+                <a:solidFill>
+                  <a:schemeClr val="tx1"/>
+                </a:solidFill>
+                <a:effectLst/>
+                <a:latin typeface="+mn-lt"/>
+                <a:ea typeface="+mn-ea"/>
+                <a:cs typeface="+mn-cs"/>
+              </a:rPr>
+              <a:t>The adversarial and the prediction models are wrapped together with a modified MSE that has a  tunable parameter to dampen the gradients. </a:t>
+            </a:r>
+          </a:p>
+          <a:p>
+            <a:pPr marL="171450" indent="-171450">
+              <a:buFont typeface="Arial" panose="020B0604020202020204" pitchFamily="34" charset="0"/>
+              <a:buChar char="•"/>
+            </a:pPr>
+            <a:r>
+              <a:rPr lang="en-US" sz="1200" kern="1200" dirty="0">
+                <a:solidFill>
+                  <a:schemeClr val="tx1"/>
+                </a:solidFill>
+                <a:effectLst/>
+                <a:latin typeface="+mn-lt"/>
+                <a:ea typeface="+mn-ea"/>
+                <a:cs typeface="+mn-cs"/>
+              </a:rPr>
+              <a:t>The loss is maximized because we want the model to be bad at predicting age. </a:t>
+            </a:r>
+          </a:p>
+          <a:p>
+            <a:pPr marL="171450" indent="-171450">
+              <a:buFont typeface="Arial" panose="020B0604020202020204" pitchFamily="34" charset="0"/>
+              <a:buChar char="•"/>
+            </a:pPr>
+            <a:r>
+              <a:rPr lang="en-US" sz="1200" kern="1200" dirty="0">
+                <a:solidFill>
+                  <a:schemeClr val="tx1"/>
+                </a:solidFill>
+                <a:effectLst/>
+                <a:latin typeface="+mn-lt"/>
+                <a:ea typeface="+mn-ea"/>
+                <a:cs typeface="+mn-cs"/>
+              </a:rPr>
+              <a:t>The prediction algorithm is the same as in our baseline  except the weights are modified from the MSE loss function as well as its original loss function .  </a:t>
+            </a:r>
+          </a:p>
+          <a:p>
+            <a:endParaRPr lang="en-US" dirty="0"/>
+          </a:p>
+        </p:txBody>
+      </p:sp>
+      <p:sp>
+        <p:nvSpPr>
+          <p:cNvPr id="4" name="Slide Number Placeholder 3"/>
+          <p:cNvSpPr>
+            <a:spLocks noGrp="1"/>
+          </p:cNvSpPr>
+          <p:nvPr>
+            <p:ph type="sldNum" sz="quarter" idx="5"/>
+          </p:nvPr>
+        </p:nvSpPr>
+        <p:spPr/>
+        <p:txBody>
+          <a:bodyPr/>
+          <a:lstStyle/>
+          <a:p>
+            <a:fld id="{BAA9633A-392A-4347-9D1C-FF5FFE9476B1}" type="slidenum">
+              <a:rPr lang="en-US" smtClean="0"/>
+              <a:t>14</a:t>
+            </a:fld>
+            <a:endParaRPr lang="en-US"/>
+          </a:p>
+        </p:txBody>
+      </p:sp>
+    </p:spTree>
+    <p:extLst>
+      <p:ext uri="{BB962C8B-B14F-4D97-AF65-F5344CB8AC3E}">
+        <p14:creationId xmlns:p14="http://schemas.microsoft.com/office/powerpoint/2010/main" val="290419068"/>
       </p:ext>
     </p:extLst>
   </p:cSld>
@@ -6095,7 +6662,7 @@
           <a:p>
             <a:fld id="{D8AC05B1-2526-7C44-8A74-66C916069F4A}" type="datetime1">
               <a:rPr lang="en-US" smtClean="0"/>
-              <a:t>7/7/2020</a:t>
+              <a:t>7/8/2020</a:t>
             </a:fld>
             <a:endParaRPr lang="en-US"/>
           </a:p>
@@ -6286,7 +6853,7 @@
           <a:p>
             <a:fld id="{C0E5C021-D243-504D-84B8-D45D829E8B6B}" type="datetime1">
               <a:rPr lang="en-US" smtClean="0"/>
-              <a:t>7/7/2020</a:t>
+              <a:t>7/8/2020</a:t>
             </a:fld>
             <a:endParaRPr lang="en-US"/>
           </a:p>
@@ -6467,7 +7034,7 @@
           <a:p>
             <a:fld id="{B6F93F85-28A1-8344-9763-EF19E19F9128}" type="datetime1">
               <a:rPr lang="en-US" smtClean="0"/>
-              <a:t>7/7/2020</a:t>
+              <a:t>7/8/2020</a:t>
             </a:fld>
             <a:endParaRPr lang="en-US"/>
           </a:p>
@@ -6731,7 +7298,7 @@
           <a:p>
             <a:fld id="{A2B5E9FB-9AD4-754B-A772-6D3733DD5BAC}" type="datetime1">
               <a:rPr lang="en-US" smtClean="0"/>
-              <a:t>7/7/2020</a:t>
+              <a:t>7/8/2020</a:t>
             </a:fld>
             <a:endParaRPr lang="en-US"/>
           </a:p>
@@ -6974,7 +7541,7 @@
           <a:p>
             <a:fld id="{3140DF9E-9222-EE48-A64D-28DE5FAE4784}" type="datetime1">
               <a:rPr lang="en-US" smtClean="0"/>
-              <a:t>7/7/2020</a:t>
+              <a:t>7/8/2020</a:t>
             </a:fld>
             <a:endParaRPr lang="en-US"/>
           </a:p>
@@ -7352,7 +7919,7 @@
           <a:p>
             <a:fld id="{A61490FA-57A5-0041-9FDC-ACD83A9AA0E7}" type="datetime1">
               <a:rPr lang="en-US" smtClean="0"/>
-              <a:t>7/7/2020</a:t>
+              <a:t>7/8/2020</a:t>
             </a:fld>
             <a:endParaRPr lang="en-US"/>
           </a:p>
@@ -7481,7 +8048,7 @@
           <a:p>
             <a:fld id="{7E8290BC-2F66-E549-BF33-0BE20A5801B5}" type="datetime1">
               <a:rPr lang="en-US" smtClean="0"/>
-              <a:t>7/7/2020</a:t>
+              <a:t>7/8/2020</a:t>
             </a:fld>
             <a:endParaRPr lang="en-US"/>
           </a:p>
@@ -7587,7 +8154,7 @@
           <a:p>
             <a:fld id="{3BC728CC-7587-8545-9431-C9A8BB34EC62}" type="datetime1">
               <a:rPr lang="en-US" smtClean="0"/>
-              <a:t>7/7/2020</a:t>
+              <a:t>7/8/2020</a:t>
             </a:fld>
             <a:endParaRPr lang="en-US"/>
           </a:p>
@@ -7875,7 +8442,7 @@
           <a:p>
             <a:fld id="{9A66CD15-5422-0542-9CE8-BC312846333A}" type="datetime1">
               <a:rPr lang="en-US" smtClean="0"/>
-              <a:t>7/7/2020</a:t>
+              <a:t>7/8/2020</a:t>
             </a:fld>
             <a:endParaRPr lang="en-US"/>
           </a:p>
@@ -8143,7 +8710,7 @@
           <a:p>
             <a:fld id="{2A2384D1-AE54-4D4A-B83F-6EAD03BEB987}" type="datetime1">
               <a:rPr lang="en-US" smtClean="0"/>
-              <a:t>7/7/2020</a:t>
+              <a:t>7/8/2020</a:t>
             </a:fld>
             <a:endParaRPr lang="en-US"/>
           </a:p>
@@ -9181,11 +9748,11 @@
   <p:clrMapOvr>
     <a:masterClrMapping/>
   </p:clrMapOvr>
-  <mc:AlternateContent xmlns:mc="http://schemas.openxmlformats.org/markup-compatibility/2006">
-    <mc:Choice xmlns:p14="http://schemas.microsoft.com/office/powerpoint/2010/main" Requires="p14">
+  <mc:AlternateContent xmlns:mc="http://schemas.openxmlformats.org/markup-compatibility/2006" xmlns:p14="http://schemas.microsoft.com/office/powerpoint/2010/main">
+    <mc:Choice Requires="p14">
       <p:transition p14:dur="0" advClick="0" advTm="15000"/>
     </mc:Choice>
-    <mc:Fallback>
+    <mc:Fallback xmlns="">
       <p:transition advClick="0" advTm="15000"/>
     </mc:Fallback>
   </mc:AlternateContent>
@@ -9358,12 +9925,12 @@
   <p:clrMapOvr>
     <a:masterClrMapping/>
   </p:clrMapOvr>
-  <mc:AlternateContent xmlns:mc="http://schemas.openxmlformats.org/markup-compatibility/2006" xmlns:p14="http://schemas.microsoft.com/office/powerpoint/2010/main">
-    <mc:Choice Requires="p14">
-      <p:transition p14:dur="0" advClick="0" advTm="15000"/>
+  <mc:AlternateContent xmlns:mc="http://schemas.openxmlformats.org/markup-compatibility/2006">
+    <mc:Choice xmlns:p14="http://schemas.microsoft.com/office/powerpoint/2010/main" Requires="p14">
+      <p:transition p14:dur="0" advClick="0" advTm="20000"/>
     </mc:Choice>
-    <mc:Fallback xmlns="">
-      <p:transition advClick="0" advTm="15000"/>
+    <mc:Fallback>
+      <p:transition advClick="0" advTm="20000"/>
     </mc:Fallback>
   </mc:AlternateContent>
 </p:sld>
@@ -9548,19 +10115,19 @@
   <p:clrMapOvr>
     <a:masterClrMapping/>
   </p:clrMapOvr>
-  <mc:AlternateContent xmlns:mc="http://schemas.openxmlformats.org/markup-compatibility/2006" xmlns:p14="http://schemas.microsoft.com/office/powerpoint/2010/main">
-    <mc:Choice Requires="p14">
-      <p:transition p14:dur="0" advClick="0" advTm="15000"/>
+  <mc:AlternateContent xmlns:mc="http://schemas.openxmlformats.org/markup-compatibility/2006">
+    <mc:Choice xmlns:p14="http://schemas.microsoft.com/office/powerpoint/2010/main" Requires="p14">
+      <p:transition p14:dur="10" advClick="0" advTm="25000"/>
     </mc:Choice>
-    <mc:Fallback xmlns="">
-      <p:transition advClick="0" advTm="15000"/>
+    <mc:Fallback>
+      <p:transition advClick="0" advTm="25000"/>
     </mc:Fallback>
   </mc:AlternateContent>
 </p:sld>
 </file>
 
 <file path=ppt/slides/slide13.xml><?xml version="1.0" encoding="utf-8"?>
-<p:sld xmlns:a="http://schemas.openxmlformats.org/drawingml/2006/main" xmlns:r="http://schemas.openxmlformats.org/officeDocument/2006/relationships" xmlns:p="http://schemas.openxmlformats.org/presentationml/2006/main">
+<p:sld xmlns:a="http://schemas.openxmlformats.org/drawingml/2006/main" xmlns:r="http://schemas.openxmlformats.org/officeDocument/2006/relationships" xmlns:p="http://schemas.openxmlformats.org/presentationml/2006/main" show="0">
   <p:cSld>
     <p:spTree>
       <p:nvGrpSpPr>
@@ -9960,11 +10527,11 @@
   <p:clrMapOvr>
     <a:masterClrMapping/>
   </p:clrMapOvr>
-  <mc:AlternateContent xmlns:mc="http://schemas.openxmlformats.org/markup-compatibility/2006" xmlns:p14="http://schemas.microsoft.com/office/powerpoint/2010/main">
-    <mc:Choice Requires="p14">
+  <mc:AlternateContent xmlns:mc="http://schemas.openxmlformats.org/markup-compatibility/2006">
+    <mc:Choice xmlns:p14="http://schemas.microsoft.com/office/powerpoint/2010/main" Requires="p14">
       <p:transition p14:dur="0" advClick="0" advTm="15000"/>
     </mc:Choice>
-    <mc:Fallback xmlns="">
+    <mc:Fallback>
       <p:transition advClick="0" advTm="15000"/>
     </mc:Fallback>
   </mc:AlternateContent>
@@ -10010,8 +10577,8 @@
           </a:p>
         </p:txBody>
       </p:sp>
-      <mc:AlternateContent xmlns:mc="http://schemas.openxmlformats.org/markup-compatibility/2006" xmlns:a14="http://schemas.microsoft.com/office/drawing/2010/main">
-        <mc:Choice Requires="a14">
+      <mc:AlternateContent xmlns:mc="http://schemas.openxmlformats.org/markup-compatibility/2006">
+        <mc:Choice xmlns:a14="http://schemas.microsoft.com/office/drawing/2010/main" Requires="a14">
           <p:sp>
             <p:nvSpPr>
               <p:cNvPr id="3" name="Content Placeholder 2"/>
@@ -10024,24 +10591,38 @@
             </p:nvSpPr>
             <p:spPr/>
             <p:txBody>
-              <a:bodyPr/>
+              <a:bodyPr>
+                <a:normAutofit/>
+              </a:bodyPr>
               <a:lstStyle/>
               <a:p>
                 <a:r>
                   <a:rPr lang="en-US" dirty="0"/>
-                  <a:t>Adversarial Architecture</a:t>
+                  <a:t>Baseline</a:t>
                 </a:r>
               </a:p>
               <a:p>
-                <a:endParaRPr lang="en-US" dirty="0"/>
+                <a:pPr lvl="1"/>
+                <a:r>
+                  <a:rPr lang="en-US" dirty="0">
+                    <a:solidFill>
+                      <a:schemeClr val="tx1"/>
+                    </a:solidFill>
+                  </a:rPr>
+                  <a:t>Logistic model </a:t>
+                </a:r>
               </a:p>
               <a:p>
+                <a:pPr lvl="1"/>
                 <a14:m>
                   <m:oMath xmlns:m="http://schemas.openxmlformats.org/officeDocument/2006/math">
                     <m:sSub>
                       <m:sSubPr>
                         <m:ctrlPr>
                           <a:rPr lang="en-US" i="1">
+                            <a:solidFill>
+                              <a:schemeClr val="tx1"/>
+                            </a:solidFill>
                             <a:latin typeface="Cambria Math" panose="02040503050406030204" pitchFamily="18" charset="0"/>
                           </a:rPr>
                         </m:ctrlPr>
@@ -10052,6 +10633,9 @@
                             <m:chr m:val="̂"/>
                             <m:ctrlPr>
                               <a:rPr lang="en-US" i="1">
+                                <a:solidFill>
+                                  <a:schemeClr val="tx1"/>
+                                </a:solidFill>
                                 <a:latin typeface="Cambria Math" panose="02040503050406030204" pitchFamily="18" charset="0"/>
                               </a:rPr>
                             </m:ctrlPr>
@@ -10059,6 +10643,9 @@
                           <m:e>
                             <m:r>
                               <a:rPr lang="en-US" i="1">
+                                <a:solidFill>
+                                  <a:schemeClr val="tx1"/>
+                                </a:solidFill>
                                 <a:latin typeface="Cambria Math" panose="02040503050406030204" pitchFamily="18" charset="0"/>
                               </a:rPr>
                               <m:t>𝑦</m:t>
@@ -10069,6 +10656,9 @@
                       <m:sub>
                         <m:r>
                           <a:rPr lang="en-US" i="1">
+                            <a:solidFill>
+                              <a:schemeClr val="tx1"/>
+                            </a:solidFill>
                             <a:latin typeface="Cambria Math" panose="02040503050406030204" pitchFamily="18" charset="0"/>
                           </a:rPr>
                           <m:t>𝐴𝑡𝑡𝑟𝑖𝑡𝑖𝑜𝑛</m:t>
@@ -10077,6 +10667,9 @@
                     </m:sSub>
                     <m:r>
                       <a:rPr lang="en-US" i="1">
+                        <a:solidFill>
+                          <a:schemeClr val="tx1"/>
+                        </a:solidFill>
                         <a:latin typeface="Cambria Math" panose="02040503050406030204" pitchFamily="18" charset="0"/>
                       </a:rPr>
                       <m:t>=</m:t>
@@ -10085,6 +10678,9 @@
                       <m:sSubPr>
                         <m:ctrlPr>
                           <a:rPr lang="en-US" i="1">
+                            <a:solidFill>
+                              <a:schemeClr val="tx1"/>
+                            </a:solidFill>
                             <a:latin typeface="Cambria Math" panose="02040503050406030204" pitchFamily="18" charset="0"/>
                           </a:rPr>
                         </m:ctrlPr>
@@ -10092,6 +10688,9 @@
                       <m:e>
                         <m:r>
                           <a:rPr lang="en-US" i="1">
+                            <a:solidFill>
+                              <a:schemeClr val="tx1"/>
+                            </a:solidFill>
                             <a:latin typeface="Cambria Math" panose="02040503050406030204" pitchFamily="18" charset="0"/>
                           </a:rPr>
                           <m:t>𝛽</m:t>
@@ -10100,6 +10699,9 @@
                       <m:sub>
                         <m:r>
                           <a:rPr lang="en-US" i="1">
+                            <a:solidFill>
+                              <a:schemeClr val="tx1"/>
+                            </a:solidFill>
                             <a:latin typeface="Cambria Math" panose="02040503050406030204" pitchFamily="18" charset="0"/>
                           </a:rPr>
                           <m:t>0</m:t>
@@ -10108,6 +10710,9 @@
                     </m:sSub>
                     <m:r>
                       <a:rPr lang="en-US" i="1">
+                        <a:solidFill>
+                          <a:schemeClr val="tx1"/>
+                        </a:solidFill>
                         <a:latin typeface="Cambria Math" panose="02040503050406030204" pitchFamily="18" charset="0"/>
                       </a:rPr>
                       <m:t>+</m:t>
@@ -10116,6 +10721,9 @@
                       <m:sSubPr>
                         <m:ctrlPr>
                           <a:rPr lang="en-US" i="1">
+                            <a:solidFill>
+                              <a:schemeClr val="tx1"/>
+                            </a:solidFill>
                             <a:latin typeface="Cambria Math" panose="02040503050406030204" pitchFamily="18" charset="0"/>
                           </a:rPr>
                         </m:ctrlPr>
@@ -10125,6 +10733,9 @@
                           <m:sSubPr>
                             <m:ctrlPr>
                               <a:rPr lang="en-US" i="1">
+                                <a:solidFill>
+                                  <a:schemeClr val="tx1"/>
+                                </a:solidFill>
                                 <a:latin typeface="Cambria Math" panose="02040503050406030204" pitchFamily="18" charset="0"/>
                               </a:rPr>
                             </m:ctrlPr>
@@ -10132,6 +10743,9 @@
                           <m:e>
                             <m:r>
                               <a:rPr lang="en-US" i="1">
+                                <a:solidFill>
+                                  <a:schemeClr val="tx1"/>
+                                </a:solidFill>
                                 <a:latin typeface="Cambria Math" panose="02040503050406030204" pitchFamily="18" charset="0"/>
                               </a:rPr>
                               <m:t>𝛽</m:t>
@@ -10140,6 +10754,9 @@
                           <m:sub>
                             <m:r>
                               <a:rPr lang="en-US" i="1">
+                                <a:solidFill>
+                                  <a:schemeClr val="tx1"/>
+                                </a:solidFill>
                                 <a:latin typeface="Cambria Math" panose="02040503050406030204" pitchFamily="18" charset="0"/>
                               </a:rPr>
                               <m:t>1</m:t>
@@ -10148,6 +10765,9 @@
                         </m:sSub>
                         <m:r>
                           <a:rPr lang="en-US" i="1">
+                            <a:solidFill>
+                              <a:schemeClr val="tx1"/>
+                            </a:solidFill>
                             <a:latin typeface="Cambria Math" panose="02040503050406030204" pitchFamily="18" charset="0"/>
                           </a:rPr>
                           <m:t>𝑥</m:t>
@@ -10156,6 +10776,9 @@
                       <m:sub>
                         <m:r>
                           <a:rPr lang="en-US" i="1">
+                            <a:solidFill>
+                              <a:schemeClr val="tx1"/>
+                            </a:solidFill>
                             <a:latin typeface="Cambria Math" panose="02040503050406030204" pitchFamily="18" charset="0"/>
                           </a:rPr>
                           <m:t>1</m:t>
@@ -10164,6 +10787,9 @@
                     </m:sSub>
                     <m:r>
                       <a:rPr lang="en-US" i="1">
+                        <a:solidFill>
+                          <a:schemeClr val="tx1"/>
+                        </a:solidFill>
                         <a:latin typeface="Cambria Math" panose="02040503050406030204" pitchFamily="18" charset="0"/>
                       </a:rPr>
                       <m:t>+</m:t>
@@ -10172,6 +10798,9 @@
                       <m:sSubPr>
                         <m:ctrlPr>
                           <a:rPr lang="en-US" i="1">
+                            <a:solidFill>
+                              <a:schemeClr val="tx1"/>
+                            </a:solidFill>
                             <a:latin typeface="Cambria Math" panose="02040503050406030204" pitchFamily="18" charset="0"/>
                           </a:rPr>
                         </m:ctrlPr>
@@ -10181,6 +10810,9 @@
                           <m:sSubPr>
                             <m:ctrlPr>
                               <a:rPr lang="en-US" i="1">
+                                <a:solidFill>
+                                  <a:schemeClr val="tx1"/>
+                                </a:solidFill>
                                 <a:latin typeface="Cambria Math" panose="02040503050406030204" pitchFamily="18" charset="0"/>
                               </a:rPr>
                             </m:ctrlPr>
@@ -10188,6 +10820,9 @@
                           <m:e>
                             <m:r>
                               <a:rPr lang="en-US" i="1">
+                                <a:solidFill>
+                                  <a:schemeClr val="tx1"/>
+                                </a:solidFill>
                                 <a:latin typeface="Cambria Math" panose="02040503050406030204" pitchFamily="18" charset="0"/>
                               </a:rPr>
                               <m:t>𝛽</m:t>
@@ -10196,6 +10831,9 @@
                           <m:sub>
                             <m:r>
                               <a:rPr lang="en-US" i="1">
+                                <a:solidFill>
+                                  <a:schemeClr val="tx1"/>
+                                </a:solidFill>
                                 <a:latin typeface="Cambria Math" panose="02040503050406030204" pitchFamily="18" charset="0"/>
                               </a:rPr>
                               <m:t>2</m:t>
@@ -10204,6 +10842,9 @@
                         </m:sSub>
                         <m:r>
                           <a:rPr lang="en-US" i="1">
+                            <a:solidFill>
+                              <a:schemeClr val="tx1"/>
+                            </a:solidFill>
                             <a:latin typeface="Cambria Math" panose="02040503050406030204" pitchFamily="18" charset="0"/>
                           </a:rPr>
                           <m:t>𝑥</m:t>
@@ -10212,6 +10853,9 @@
                       <m:sub>
                         <m:r>
                           <a:rPr lang="en-US" i="1">
+                            <a:solidFill>
+                              <a:schemeClr val="tx1"/>
+                            </a:solidFill>
                             <a:latin typeface="Cambria Math" panose="02040503050406030204" pitchFamily="18" charset="0"/>
                           </a:rPr>
                           <m:t>2</m:t>
@@ -10220,6 +10864,9 @@
                     </m:sSub>
                     <m:r>
                       <a:rPr lang="en-US" i="1">
+                        <a:solidFill>
+                          <a:schemeClr val="tx1"/>
+                        </a:solidFill>
                         <a:latin typeface="Cambria Math" panose="02040503050406030204" pitchFamily="18" charset="0"/>
                       </a:rPr>
                       <m:t>+</m:t>
@@ -10228,6 +10875,9 @@
                       <m:sSubPr>
                         <m:ctrlPr>
                           <a:rPr lang="en-US" i="1">
+                            <a:solidFill>
+                              <a:schemeClr val="tx1"/>
+                            </a:solidFill>
                             <a:latin typeface="Cambria Math" panose="02040503050406030204" pitchFamily="18" charset="0"/>
                           </a:rPr>
                         </m:ctrlPr>
@@ -10237,6 +10887,9 @@
                           <m:sSubPr>
                             <m:ctrlPr>
                               <a:rPr lang="en-US" i="1">
+                                <a:solidFill>
+                                  <a:schemeClr val="tx1"/>
+                                </a:solidFill>
                                 <a:latin typeface="Cambria Math" panose="02040503050406030204" pitchFamily="18" charset="0"/>
                               </a:rPr>
                             </m:ctrlPr>
@@ -10244,6 +10897,9 @@
                           <m:e>
                             <m:r>
                               <a:rPr lang="en-US" i="1">
+                                <a:solidFill>
+                                  <a:schemeClr val="tx1"/>
+                                </a:solidFill>
                                 <a:latin typeface="Cambria Math" panose="02040503050406030204" pitchFamily="18" charset="0"/>
                               </a:rPr>
                               <m:t>𝛽</m:t>
@@ -10252,6 +10908,9 @@
                           <m:sub>
                             <m:r>
                               <a:rPr lang="en-US" i="1">
+                                <a:solidFill>
+                                  <a:schemeClr val="tx1"/>
+                                </a:solidFill>
                                 <a:latin typeface="Cambria Math" panose="02040503050406030204" pitchFamily="18" charset="0"/>
                               </a:rPr>
                               <m:t>𝑛</m:t>
@@ -10260,6 +10919,9 @@
                         </m:sSub>
                         <m:r>
                           <a:rPr lang="en-US" i="1">
+                            <a:solidFill>
+                              <a:schemeClr val="tx1"/>
+                            </a:solidFill>
                             <a:latin typeface="Cambria Math" panose="02040503050406030204" pitchFamily="18" charset="0"/>
                           </a:rPr>
                           <m:t>𝑥</m:t>
@@ -10268,6 +10930,9 @@
                       <m:sub>
                         <m:r>
                           <a:rPr lang="en-US" i="1">
+                            <a:solidFill>
+                              <a:schemeClr val="tx1"/>
+                            </a:solidFill>
                             <a:latin typeface="Cambria Math" panose="02040503050406030204" pitchFamily="18" charset="0"/>
                           </a:rPr>
                           <m:t>𝑛</m:t>
@@ -10276,27 +10941,50 @@
                     </m:sSub>
                     <m:r>
                       <a:rPr lang="en-US" i="1">
+                        <a:solidFill>
+                          <a:schemeClr val="tx1"/>
+                        </a:solidFill>
                         <a:latin typeface="Cambria Math" panose="02040503050406030204" pitchFamily="18" charset="0"/>
                       </a:rPr>
                       <m:t>+</m:t>
                     </m:r>
                     <m:r>
                       <a:rPr lang="en-US" i="1">
+                        <a:solidFill>
+                          <a:schemeClr val="tx1"/>
+                        </a:solidFill>
                         <a:latin typeface="Cambria Math" panose="02040503050406030204" pitchFamily="18" charset="0"/>
                       </a:rPr>
                       <m:t>𝜀</m:t>
                     </m:r>
                   </m:oMath>
                 </a14:m>
+                <a:endParaRPr lang="en-US" dirty="0">
+                  <a:solidFill>
+                    <a:schemeClr val="tx1"/>
+                  </a:solidFill>
+                </a:endParaRPr>
+              </a:p>
+              <a:p>
                 <a:endParaRPr lang="en-US" dirty="0"/>
               </a:p>
               <a:p>
+                <a:r>
+                  <a:rPr lang="en-US" dirty="0"/>
+                  <a:t>Adversarial Architecture</a:t>
+                </a:r>
+              </a:p>
+              <a:p>
+                <a:pPr lvl="1"/>
                 <a14:m>
                   <m:oMath xmlns:m="http://schemas.openxmlformats.org/officeDocument/2006/math">
                     <m:sSub>
                       <m:sSubPr>
                         <m:ctrlPr>
-                          <a:rPr lang="en-US" i="1">
+                          <a:rPr lang="en-US" i="1" smtClean="0">
+                            <a:solidFill>
+                              <a:schemeClr val="tx1"/>
+                            </a:solidFill>
                             <a:latin typeface="Cambria Math" panose="02040503050406030204" pitchFamily="18" charset="0"/>
                           </a:rPr>
                         </m:ctrlPr>
@@ -10307,6 +10995,9 @@
                             <m:chr m:val="̂"/>
                             <m:ctrlPr>
                               <a:rPr lang="en-US" i="1">
+                                <a:solidFill>
+                                  <a:schemeClr val="tx1"/>
+                                </a:solidFill>
                                 <a:latin typeface="Cambria Math" panose="02040503050406030204" pitchFamily="18" charset="0"/>
                               </a:rPr>
                             </m:ctrlPr>
@@ -10314,6 +11005,362 @@
                           <m:e>
                             <m:r>
                               <a:rPr lang="en-US" i="1">
+                                <a:solidFill>
+                                  <a:schemeClr val="tx1"/>
+                                </a:solidFill>
+                                <a:latin typeface="Cambria Math" panose="02040503050406030204" pitchFamily="18" charset="0"/>
+                              </a:rPr>
+                              <m:t>𝑦</m:t>
+                            </m:r>
+                          </m:e>
+                        </m:acc>
+                      </m:e>
+                      <m:sub>
+                        <m:r>
+                          <a:rPr lang="en-US" i="1">
+                            <a:solidFill>
+                              <a:schemeClr val="tx1"/>
+                            </a:solidFill>
+                            <a:latin typeface="Cambria Math" panose="02040503050406030204" pitchFamily="18" charset="0"/>
+                          </a:rPr>
+                          <m:t>𝐴𝑡𝑡𝑟𝑖𝑡𝑖𝑜𝑛</m:t>
+                        </m:r>
+                      </m:sub>
+                    </m:sSub>
+                    <m:r>
+                      <a:rPr lang="en-US" i="1">
+                        <a:solidFill>
+                          <a:schemeClr val="tx1"/>
+                        </a:solidFill>
+                        <a:latin typeface="Cambria Math" panose="02040503050406030204" pitchFamily="18" charset="0"/>
+                      </a:rPr>
+                      <m:t>=</m:t>
+                    </m:r>
+                    <m:sSub>
+                      <m:sSubPr>
+                        <m:ctrlPr>
+                          <a:rPr lang="en-US" i="1">
+                            <a:solidFill>
+                              <a:schemeClr val="tx1"/>
+                            </a:solidFill>
+                            <a:latin typeface="Cambria Math" panose="02040503050406030204" pitchFamily="18" charset="0"/>
+                          </a:rPr>
+                        </m:ctrlPr>
+                      </m:sSubPr>
+                      <m:e>
+                        <m:r>
+                          <a:rPr lang="en-US" i="1">
+                            <a:solidFill>
+                              <a:schemeClr val="tx1"/>
+                            </a:solidFill>
+                            <a:latin typeface="Cambria Math" panose="02040503050406030204" pitchFamily="18" charset="0"/>
+                          </a:rPr>
+                          <m:t>𝛽</m:t>
+                        </m:r>
+                      </m:e>
+                      <m:sub>
+                        <m:r>
+                          <a:rPr lang="en-US" i="1">
+                            <a:solidFill>
+                              <a:schemeClr val="tx1"/>
+                            </a:solidFill>
+                            <a:latin typeface="Cambria Math" panose="02040503050406030204" pitchFamily="18" charset="0"/>
+                          </a:rPr>
+                          <m:t>0</m:t>
+                        </m:r>
+                      </m:sub>
+                    </m:sSub>
+                    <m:r>
+                      <a:rPr lang="en-US" i="1">
+                        <a:solidFill>
+                          <a:schemeClr val="tx1"/>
+                        </a:solidFill>
+                        <a:latin typeface="Cambria Math" panose="02040503050406030204" pitchFamily="18" charset="0"/>
+                      </a:rPr>
+                      <m:t>+</m:t>
+                    </m:r>
+                    <m:sSub>
+                      <m:sSubPr>
+                        <m:ctrlPr>
+                          <a:rPr lang="en-US" i="1">
+                            <a:solidFill>
+                              <a:schemeClr val="tx1"/>
+                            </a:solidFill>
+                            <a:latin typeface="Cambria Math" panose="02040503050406030204" pitchFamily="18" charset="0"/>
+                          </a:rPr>
+                        </m:ctrlPr>
+                      </m:sSubPr>
+                      <m:e>
+                        <m:sSub>
+                          <m:sSubPr>
+                            <m:ctrlPr>
+                              <a:rPr lang="en-US" i="1">
+                                <a:solidFill>
+                                  <a:schemeClr val="tx1"/>
+                                </a:solidFill>
+                                <a:latin typeface="Cambria Math" panose="02040503050406030204" pitchFamily="18" charset="0"/>
+                              </a:rPr>
+                            </m:ctrlPr>
+                          </m:sSubPr>
+                          <m:e>
+                            <m:r>
+                              <a:rPr lang="en-US" i="1">
+                                <a:solidFill>
+                                  <a:schemeClr val="tx1"/>
+                                </a:solidFill>
+                                <a:latin typeface="Cambria Math" panose="02040503050406030204" pitchFamily="18" charset="0"/>
+                              </a:rPr>
+                              <m:t>𝛽</m:t>
+                            </m:r>
+                          </m:e>
+                          <m:sub>
+                            <m:r>
+                              <a:rPr lang="en-US" i="1">
+                                <a:solidFill>
+                                  <a:schemeClr val="tx1"/>
+                                </a:solidFill>
+                                <a:latin typeface="Cambria Math" panose="02040503050406030204" pitchFamily="18" charset="0"/>
+                              </a:rPr>
+                              <m:t>1</m:t>
+                            </m:r>
+                          </m:sub>
+                        </m:sSub>
+                        <m:r>
+                          <a:rPr lang="en-US" i="1">
+                            <a:solidFill>
+                              <a:schemeClr val="tx1"/>
+                            </a:solidFill>
+                            <a:latin typeface="Cambria Math" panose="02040503050406030204" pitchFamily="18" charset="0"/>
+                          </a:rPr>
+                          <m:t>𝑥</m:t>
+                        </m:r>
+                      </m:e>
+                      <m:sub>
+                        <m:r>
+                          <a:rPr lang="en-US" i="1">
+                            <a:solidFill>
+                              <a:schemeClr val="tx1"/>
+                            </a:solidFill>
+                            <a:latin typeface="Cambria Math" panose="02040503050406030204" pitchFamily="18" charset="0"/>
+                          </a:rPr>
+                          <m:t>1</m:t>
+                        </m:r>
+                      </m:sub>
+                    </m:sSub>
+                    <m:r>
+                      <a:rPr lang="en-US" i="1">
+                        <a:solidFill>
+                          <a:schemeClr val="tx1"/>
+                        </a:solidFill>
+                        <a:latin typeface="Cambria Math" panose="02040503050406030204" pitchFamily="18" charset="0"/>
+                      </a:rPr>
+                      <m:t>+</m:t>
+                    </m:r>
+                    <m:sSub>
+                      <m:sSubPr>
+                        <m:ctrlPr>
+                          <a:rPr lang="en-US" i="1">
+                            <a:solidFill>
+                              <a:schemeClr val="tx1"/>
+                            </a:solidFill>
+                            <a:latin typeface="Cambria Math" panose="02040503050406030204" pitchFamily="18" charset="0"/>
+                          </a:rPr>
+                        </m:ctrlPr>
+                      </m:sSubPr>
+                      <m:e>
+                        <m:sSub>
+                          <m:sSubPr>
+                            <m:ctrlPr>
+                              <a:rPr lang="en-US" i="1">
+                                <a:solidFill>
+                                  <a:schemeClr val="tx1"/>
+                                </a:solidFill>
+                                <a:latin typeface="Cambria Math" panose="02040503050406030204" pitchFamily="18" charset="0"/>
+                              </a:rPr>
+                            </m:ctrlPr>
+                          </m:sSubPr>
+                          <m:e>
+                            <m:r>
+                              <a:rPr lang="en-US" i="1">
+                                <a:solidFill>
+                                  <a:schemeClr val="tx1"/>
+                                </a:solidFill>
+                                <a:latin typeface="Cambria Math" panose="02040503050406030204" pitchFamily="18" charset="0"/>
+                              </a:rPr>
+                              <m:t>𝛽</m:t>
+                            </m:r>
+                          </m:e>
+                          <m:sub>
+                            <m:r>
+                              <a:rPr lang="en-US" i="1">
+                                <a:solidFill>
+                                  <a:schemeClr val="tx1"/>
+                                </a:solidFill>
+                                <a:latin typeface="Cambria Math" panose="02040503050406030204" pitchFamily="18" charset="0"/>
+                              </a:rPr>
+                              <m:t>2</m:t>
+                            </m:r>
+                          </m:sub>
+                        </m:sSub>
+                        <m:r>
+                          <a:rPr lang="en-US" i="1">
+                            <a:solidFill>
+                              <a:schemeClr val="tx1"/>
+                            </a:solidFill>
+                            <a:latin typeface="Cambria Math" panose="02040503050406030204" pitchFamily="18" charset="0"/>
+                          </a:rPr>
+                          <m:t>𝑥</m:t>
+                        </m:r>
+                      </m:e>
+                      <m:sub>
+                        <m:r>
+                          <a:rPr lang="en-US" i="1">
+                            <a:solidFill>
+                              <a:schemeClr val="tx1"/>
+                            </a:solidFill>
+                            <a:latin typeface="Cambria Math" panose="02040503050406030204" pitchFamily="18" charset="0"/>
+                          </a:rPr>
+                          <m:t>2</m:t>
+                        </m:r>
+                      </m:sub>
+                    </m:sSub>
+                    <m:r>
+                      <a:rPr lang="en-US" i="1">
+                        <a:solidFill>
+                          <a:schemeClr val="tx1"/>
+                        </a:solidFill>
+                        <a:latin typeface="Cambria Math" panose="02040503050406030204" pitchFamily="18" charset="0"/>
+                      </a:rPr>
+                      <m:t>+</m:t>
+                    </m:r>
+                    <m:sSub>
+                      <m:sSubPr>
+                        <m:ctrlPr>
+                          <a:rPr lang="en-US" i="1">
+                            <a:solidFill>
+                              <a:schemeClr val="tx1"/>
+                            </a:solidFill>
+                            <a:latin typeface="Cambria Math" panose="02040503050406030204" pitchFamily="18" charset="0"/>
+                          </a:rPr>
+                        </m:ctrlPr>
+                      </m:sSubPr>
+                      <m:e>
+                        <m:sSub>
+                          <m:sSubPr>
+                            <m:ctrlPr>
+                              <a:rPr lang="en-US" i="1">
+                                <a:solidFill>
+                                  <a:schemeClr val="tx1"/>
+                                </a:solidFill>
+                                <a:latin typeface="Cambria Math" panose="02040503050406030204" pitchFamily="18" charset="0"/>
+                              </a:rPr>
+                            </m:ctrlPr>
+                          </m:sSubPr>
+                          <m:e>
+                            <m:r>
+                              <a:rPr lang="en-US" i="1">
+                                <a:solidFill>
+                                  <a:schemeClr val="tx1"/>
+                                </a:solidFill>
+                                <a:latin typeface="Cambria Math" panose="02040503050406030204" pitchFamily="18" charset="0"/>
+                              </a:rPr>
+                              <m:t>𝛽</m:t>
+                            </m:r>
+                          </m:e>
+                          <m:sub>
+                            <m:r>
+                              <a:rPr lang="en-US" i="1">
+                                <a:solidFill>
+                                  <a:schemeClr val="tx1"/>
+                                </a:solidFill>
+                                <a:latin typeface="Cambria Math" panose="02040503050406030204" pitchFamily="18" charset="0"/>
+                              </a:rPr>
+                              <m:t>𝑛</m:t>
+                            </m:r>
+                          </m:sub>
+                        </m:sSub>
+                        <m:r>
+                          <a:rPr lang="en-US" i="1">
+                            <a:solidFill>
+                              <a:schemeClr val="tx1"/>
+                            </a:solidFill>
+                            <a:latin typeface="Cambria Math" panose="02040503050406030204" pitchFamily="18" charset="0"/>
+                          </a:rPr>
+                          <m:t>𝑥</m:t>
+                        </m:r>
+                      </m:e>
+                      <m:sub>
+                        <m:r>
+                          <a:rPr lang="en-US" i="1">
+                            <a:solidFill>
+                              <a:schemeClr val="tx1"/>
+                            </a:solidFill>
+                            <a:latin typeface="Cambria Math" panose="02040503050406030204" pitchFamily="18" charset="0"/>
+                          </a:rPr>
+                          <m:t>𝑛</m:t>
+                        </m:r>
+                      </m:sub>
+                    </m:sSub>
+                    <m:r>
+                      <a:rPr lang="en-US" i="1">
+                        <a:solidFill>
+                          <a:schemeClr val="tx1"/>
+                        </a:solidFill>
+                        <a:latin typeface="Cambria Math" panose="02040503050406030204" pitchFamily="18" charset="0"/>
+                      </a:rPr>
+                      <m:t>+</m:t>
+                    </m:r>
+                    <m:r>
+                      <a:rPr lang="en-US" i="1">
+                        <a:solidFill>
+                          <a:schemeClr val="tx1"/>
+                        </a:solidFill>
+                        <a:latin typeface="Cambria Math" panose="02040503050406030204" pitchFamily="18" charset="0"/>
+                      </a:rPr>
+                      <m:t>𝜀</m:t>
+                    </m:r>
+                  </m:oMath>
+                </a14:m>
+                <a:endParaRPr lang="en-US" dirty="0">
+                  <a:solidFill>
+                    <a:schemeClr val="tx1"/>
+                  </a:solidFill>
+                </a:endParaRPr>
+              </a:p>
+              <a:p>
+                <a:pPr lvl="1"/>
+                <a14:m>
+                  <m:oMath xmlns:m="http://schemas.openxmlformats.org/officeDocument/2006/math">
+                    <m:sSub>
+                      <m:sSubPr>
+                        <m:ctrlPr>
+                          <a:rPr lang="en-US" i="1">
+                            <a:solidFill>
+                              <a:schemeClr val="tx1"/>
+                            </a:solidFill>
+                            <a:latin typeface="Cambria Math" panose="02040503050406030204" pitchFamily="18" charset="0"/>
+                          </a:rPr>
+                        </m:ctrlPr>
+                      </m:sSubPr>
+                      <m:e>
+                        <m:acc>
+                          <m:accPr>
+                            <m:chr m:val="̂"/>
+                            <m:ctrlPr>
+                              <a:rPr lang="en-US" i="1">
+                                <a:solidFill>
+                                  <a:schemeClr val="tx1"/>
+                                </a:solidFill>
+                                <a:latin typeface="Cambria Math" panose="02040503050406030204" pitchFamily="18" charset="0"/>
+                              </a:rPr>
+                            </m:ctrlPr>
+                          </m:accPr>
+                          <m:e>
+                            <m:r>
+                              <a:rPr lang="en-US" i="1">
+                                <a:solidFill>
+                                  <a:schemeClr val="tx1"/>
+                                </a:solidFill>
                                 <a:latin typeface="Cambria Math" panose="02040503050406030204" pitchFamily="18" charset="0"/>
                               </a:rPr>
                               <m:t>𝐴</m:t>
@@ -10324,6 +11371,9 @@
                       <m:sub>
                         <m:r>
                           <a:rPr lang="en-US" i="1">
+                            <a:solidFill>
+                              <a:schemeClr val="tx1"/>
+                            </a:solidFill>
                             <a:latin typeface="Cambria Math" panose="02040503050406030204" pitchFamily="18" charset="0"/>
                           </a:rPr>
                           <m:t>𝐴𝑔𝑒</m:t>
@@ -10332,6 +11382,9 @@
                     </m:sSub>
                     <m:r>
                       <a:rPr lang="en-US" i="1">
+                        <a:solidFill>
+                          <a:schemeClr val="tx1"/>
+                        </a:solidFill>
                         <a:latin typeface="Cambria Math" panose="02040503050406030204" pitchFamily="18" charset="0"/>
                       </a:rPr>
                       <m:t>=</m:t>
@@ -10340,6 +11393,9 @@
                       <m:sSubPr>
                         <m:ctrlPr>
                           <a:rPr lang="en-US" i="1">
+                            <a:solidFill>
+                              <a:schemeClr val="tx1"/>
+                            </a:solidFill>
                             <a:latin typeface="Cambria Math" panose="02040503050406030204" pitchFamily="18" charset="0"/>
                           </a:rPr>
                         </m:ctrlPr>
@@ -10347,6 +11403,9 @@
                       <m:e>
                         <m:r>
                           <a:rPr lang="en-US" i="1">
+                            <a:solidFill>
+                              <a:schemeClr val="tx1"/>
+                            </a:solidFill>
                             <a:latin typeface="Cambria Math" panose="02040503050406030204" pitchFamily="18" charset="0"/>
                           </a:rPr>
                           <m:t>𝛽</m:t>
@@ -10355,6 +11414,9 @@
                       <m:sub>
                         <m:r>
                           <a:rPr lang="en-US" i="1">
+                            <a:solidFill>
+                              <a:schemeClr val="tx1"/>
+                            </a:solidFill>
                             <a:latin typeface="Cambria Math" panose="02040503050406030204" pitchFamily="18" charset="0"/>
                           </a:rPr>
                           <m:t>0</m:t>
@@ -10363,6 +11425,9 @@
                     </m:sSub>
                     <m:r>
                       <a:rPr lang="en-US" i="1">
+                        <a:solidFill>
+                          <a:schemeClr val="tx1"/>
+                        </a:solidFill>
                         <a:latin typeface="Cambria Math" panose="02040503050406030204" pitchFamily="18" charset="0"/>
                       </a:rPr>
                       <m:t>+</m:t>
@@ -10371,6 +11436,9 @@
                       <m:sSubPr>
                         <m:ctrlPr>
                           <a:rPr lang="en-US" i="1">
+                            <a:solidFill>
+                              <a:schemeClr val="tx1"/>
+                            </a:solidFill>
                             <a:latin typeface="Cambria Math" panose="02040503050406030204" pitchFamily="18" charset="0"/>
                           </a:rPr>
                         </m:ctrlPr>
@@ -10380,6 +11448,9 @@
                           <m:sSubPr>
                             <m:ctrlPr>
                               <a:rPr lang="en-US" i="1">
+                                <a:solidFill>
+                                  <a:schemeClr val="tx1"/>
+                                </a:solidFill>
                                 <a:latin typeface="Cambria Math" panose="02040503050406030204" pitchFamily="18" charset="0"/>
                               </a:rPr>
                             </m:ctrlPr>
@@ -10387,6 +11458,9 @@
                           <m:e>
                             <m:r>
                               <a:rPr lang="en-US" i="1">
+                                <a:solidFill>
+                                  <a:schemeClr val="tx1"/>
+                                </a:solidFill>
                                 <a:latin typeface="Cambria Math" panose="02040503050406030204" pitchFamily="18" charset="0"/>
                               </a:rPr>
                               <m:t>𝛽</m:t>
@@ -10395,6 +11469,9 @@
                           <m:sub>
                             <m:r>
                               <a:rPr lang="en-US" i="1">
+                                <a:solidFill>
+                                  <a:schemeClr val="tx1"/>
+                                </a:solidFill>
                                 <a:latin typeface="Cambria Math" panose="02040503050406030204" pitchFamily="18" charset="0"/>
                               </a:rPr>
                               <m:t>1</m:t>
@@ -10403,6 +11480,9 @@
                         </m:sSub>
                         <m:r>
                           <a:rPr lang="en-US" i="1">
+                            <a:solidFill>
+                              <a:schemeClr val="tx1"/>
+                            </a:solidFill>
                             <a:latin typeface="Cambria Math" panose="02040503050406030204" pitchFamily="18" charset="0"/>
                           </a:rPr>
                           <m:t>𝑥</m:t>
@@ -10411,6 +11491,9 @@
                       <m:sub>
                         <m:r>
                           <a:rPr lang="en-US" i="1">
+                            <a:solidFill>
+                              <a:schemeClr val="tx1"/>
+                            </a:solidFill>
                             <a:latin typeface="Cambria Math" panose="02040503050406030204" pitchFamily="18" charset="0"/>
                           </a:rPr>
                           <m:t>1</m:t>
@@ -10419,6 +11502,9 @@
                     </m:sSub>
                     <m:r>
                       <a:rPr lang="en-US" i="1">
+                        <a:solidFill>
+                          <a:schemeClr val="tx1"/>
+                        </a:solidFill>
                         <a:latin typeface="Cambria Math" panose="02040503050406030204" pitchFamily="18" charset="0"/>
                       </a:rPr>
                       <m:t>+</m:t>
@@ -10427,6 +11513,9 @@
                       <m:sSubPr>
                         <m:ctrlPr>
                           <a:rPr lang="en-US" i="1">
+                            <a:solidFill>
+                              <a:schemeClr val="tx1"/>
+                            </a:solidFill>
                             <a:latin typeface="Cambria Math" panose="02040503050406030204" pitchFamily="18" charset="0"/>
                           </a:rPr>
                         </m:ctrlPr>
@@ -10436,6 +11525,9 @@
                           <m:sSubPr>
                             <m:ctrlPr>
                               <a:rPr lang="en-US" i="1">
+                                <a:solidFill>
+                                  <a:schemeClr val="tx1"/>
+                                </a:solidFill>
                                 <a:latin typeface="Cambria Math" panose="02040503050406030204" pitchFamily="18" charset="0"/>
                               </a:rPr>
                             </m:ctrlPr>
@@ -10443,6 +11535,9 @@
                           <m:e>
                             <m:r>
                               <a:rPr lang="en-US" i="1">
+                                <a:solidFill>
+                                  <a:schemeClr val="tx1"/>
+                                </a:solidFill>
                                 <a:latin typeface="Cambria Math" panose="02040503050406030204" pitchFamily="18" charset="0"/>
                               </a:rPr>
                               <m:t>𝛽</m:t>
@@ -10451,6 +11546,9 @@
                           <m:sub>
                             <m:r>
                               <a:rPr lang="en-US" i="1">
+                                <a:solidFill>
+                                  <a:schemeClr val="tx1"/>
+                                </a:solidFill>
                                 <a:latin typeface="Cambria Math" panose="02040503050406030204" pitchFamily="18" charset="0"/>
                               </a:rPr>
                               <m:t>2</m:t>
@@ -10459,6 +11557,9 @@
                         </m:sSub>
                         <m:r>
                           <a:rPr lang="en-US" i="1">
+                            <a:solidFill>
+                              <a:schemeClr val="tx1"/>
+                            </a:solidFill>
                             <a:latin typeface="Cambria Math" panose="02040503050406030204" pitchFamily="18" charset="0"/>
                           </a:rPr>
                           <m:t>𝑥</m:t>
@@ -10467,6 +11568,9 @@
                       <m:sub>
                         <m:r>
                           <a:rPr lang="en-US" i="1">
+                            <a:solidFill>
+                              <a:schemeClr val="tx1"/>
+                            </a:solidFill>
                             <a:latin typeface="Cambria Math" panose="02040503050406030204" pitchFamily="18" charset="0"/>
                           </a:rPr>
                           <m:t>2</m:t>
@@ -10475,6 +11579,9 @@
                     </m:sSub>
                     <m:r>
                       <a:rPr lang="en-US" i="1">
+                        <a:solidFill>
+                          <a:schemeClr val="tx1"/>
+                        </a:solidFill>
                         <a:latin typeface="Cambria Math" panose="02040503050406030204" pitchFamily="18" charset="0"/>
                       </a:rPr>
                       <m:t>+</m:t>
@@ -10483,6 +11590,9 @@
                       <m:sSubPr>
                         <m:ctrlPr>
                           <a:rPr lang="en-US" i="1">
+                            <a:solidFill>
+                              <a:schemeClr val="tx1"/>
+                            </a:solidFill>
                             <a:latin typeface="Cambria Math" panose="02040503050406030204" pitchFamily="18" charset="0"/>
                           </a:rPr>
                         </m:ctrlPr>
@@ -10492,6 +11602,9 @@
                           <m:sSubPr>
                             <m:ctrlPr>
                               <a:rPr lang="en-US" i="1">
+                                <a:solidFill>
+                                  <a:schemeClr val="tx1"/>
+                                </a:solidFill>
                                 <a:latin typeface="Cambria Math" panose="02040503050406030204" pitchFamily="18" charset="0"/>
                               </a:rPr>
                             </m:ctrlPr>
@@ -10499,6 +11612,9 @@
                           <m:e>
                             <m:r>
                               <a:rPr lang="en-US" i="1">
+                                <a:solidFill>
+                                  <a:schemeClr val="tx1"/>
+                                </a:solidFill>
                                 <a:latin typeface="Cambria Math" panose="02040503050406030204" pitchFamily="18" charset="0"/>
                               </a:rPr>
                               <m:t>𝛽</m:t>
@@ -10507,6 +11623,9 @@
                           <m:sub>
                             <m:r>
                               <a:rPr lang="en-US" i="1">
+                                <a:solidFill>
+                                  <a:schemeClr val="tx1"/>
+                                </a:solidFill>
                                 <a:latin typeface="Cambria Math" panose="02040503050406030204" pitchFamily="18" charset="0"/>
                               </a:rPr>
                               <m:t>𝑛</m:t>
@@ -10515,6 +11634,9 @@
                         </m:sSub>
                         <m:r>
                           <a:rPr lang="en-US" i="1">
+                            <a:solidFill>
+                              <a:schemeClr val="tx1"/>
+                            </a:solidFill>
                             <a:latin typeface="Cambria Math" panose="02040503050406030204" pitchFamily="18" charset="0"/>
                           </a:rPr>
                           <m:t>𝑥</m:t>
@@ -10523,6 +11645,9 @@
                       <m:sub>
                         <m:r>
                           <a:rPr lang="en-US" i="1">
+                            <a:solidFill>
+                              <a:schemeClr val="tx1"/>
+                            </a:solidFill>
                             <a:latin typeface="Cambria Math" panose="02040503050406030204" pitchFamily="18" charset="0"/>
                           </a:rPr>
                           <m:t>𝑛</m:t>
@@ -10531,37 +11656,57 @@
                     </m:sSub>
                     <m:r>
                       <a:rPr lang="en-US" i="1">
+                        <a:solidFill>
+                          <a:schemeClr val="tx1"/>
+                        </a:solidFill>
                         <a:latin typeface="Cambria Math" panose="02040503050406030204" pitchFamily="18" charset="0"/>
                       </a:rPr>
                       <m:t>+</m:t>
                     </m:r>
                     <m:r>
                       <a:rPr lang="en-US" i="1">
+                        <a:solidFill>
+                          <a:schemeClr val="tx1"/>
+                        </a:solidFill>
                         <a:latin typeface="Cambria Math" panose="02040503050406030204" pitchFamily="18" charset="0"/>
                       </a:rPr>
                       <m:t>𝜀</m:t>
                     </m:r>
                   </m:oMath>
                 </a14:m>
-                <a:endParaRPr lang="en-US" dirty="0"/>
+                <a:endParaRPr lang="en-US" dirty="0">
+                  <a:solidFill>
+                    <a:schemeClr val="tx1"/>
+                  </a:solidFill>
+                </a:endParaRPr>
               </a:p>
               <a:p>
+                <a:pPr lvl="1"/>
                 <a14:m>
                   <m:oMath xmlns:m="http://schemas.openxmlformats.org/officeDocument/2006/math">
                     <m:r>
                       <a:rPr lang="en-US" i="1">
+                        <a:solidFill>
+                          <a:schemeClr val="tx1"/>
+                        </a:solidFill>
                         <a:latin typeface="Cambria Math" panose="02040503050406030204" pitchFamily="18" charset="0"/>
                       </a:rPr>
                       <m:t>𝐿𝑜𝑠𝑠</m:t>
                     </m:r>
                     <m:r>
                       <a:rPr lang="en-US" i="1">
+                        <a:solidFill>
+                          <a:schemeClr val="tx1"/>
+                        </a:solidFill>
                         <a:latin typeface="Cambria Math" panose="02040503050406030204" pitchFamily="18" charset="0"/>
                       </a:rPr>
                       <m:t>=−</m:t>
                     </m:r>
                     <m:r>
                       <a:rPr lang="en-US" i="1">
+                        <a:solidFill>
+                          <a:schemeClr val="tx1"/>
+                        </a:solidFill>
                         <a:latin typeface="Cambria Math" panose="02040503050406030204" pitchFamily="18" charset="0"/>
                       </a:rPr>
                       <m:t>𝛼</m:t>
@@ -10572,6 +11717,9 @@
                         <m:limLoc m:val="undOvr"/>
                         <m:ctrlPr>
                           <a:rPr lang="en-US" i="1">
+                            <a:solidFill>
+                              <a:schemeClr val="tx1"/>
+                            </a:solidFill>
                             <a:latin typeface="Cambria Math" panose="02040503050406030204" pitchFamily="18" charset="0"/>
                           </a:rPr>
                         </m:ctrlPr>
@@ -10579,12 +11727,18 @@
                       <m:sub>
                         <m:r>
                           <a:rPr lang="en-US" i="1">
+                            <a:solidFill>
+                              <a:schemeClr val="tx1"/>
+                            </a:solidFill>
                             <a:latin typeface="Cambria Math" panose="02040503050406030204" pitchFamily="18" charset="0"/>
                           </a:rPr>
                           <m:t>𝑖</m:t>
                         </m:r>
                         <m:r>
                           <a:rPr lang="en-US" i="1">
+                            <a:solidFill>
+                              <a:schemeClr val="tx1"/>
+                            </a:solidFill>
                             <a:latin typeface="Cambria Math" panose="02040503050406030204" pitchFamily="18" charset="0"/>
                           </a:rPr>
                           <m:t>=1</m:t>
@@ -10593,6 +11747,9 @@
                       <m:sup>
                         <m:r>
                           <a:rPr lang="en-US" i="1">
+                            <a:solidFill>
+                              <a:schemeClr val="tx1"/>
+                            </a:solidFill>
                             <a:latin typeface="Cambria Math" panose="02040503050406030204" pitchFamily="18" charset="0"/>
                           </a:rPr>
                           <m:t>𝑛</m:t>
@@ -10603,6 +11760,9 @@
                           <m:sSupPr>
                             <m:ctrlPr>
                               <a:rPr lang="en-US" i="1">
+                                <a:solidFill>
+                                  <a:schemeClr val="tx1"/>
+                                </a:solidFill>
                                 <a:latin typeface="Cambria Math" panose="02040503050406030204" pitchFamily="18" charset="0"/>
                               </a:rPr>
                             </m:ctrlPr>
@@ -10610,6 +11770,9 @@
                           <m:e>
                             <m:r>
                               <a:rPr lang="en-US" i="1">
+                                <a:solidFill>
+                                  <a:schemeClr val="tx1"/>
+                                </a:solidFill>
                                 <a:latin typeface="Cambria Math" panose="02040503050406030204" pitchFamily="18" charset="0"/>
                               </a:rPr>
                               <m:t>(</m:t>
@@ -10618,6 +11781,9 @@
                               <m:sSubPr>
                                 <m:ctrlPr>
                                   <a:rPr lang="en-US" i="1">
+                                    <a:solidFill>
+                                      <a:schemeClr val="tx1"/>
+                                    </a:solidFill>
                                     <a:latin typeface="Cambria Math" panose="02040503050406030204" pitchFamily="18" charset="0"/>
                                   </a:rPr>
                                 </m:ctrlPr>
@@ -10625,6 +11791,9 @@
                               <m:e>
                                 <m:r>
                                   <a:rPr lang="en-US" i="1">
+                                    <a:solidFill>
+                                      <a:schemeClr val="tx1"/>
+                                    </a:solidFill>
                                     <a:latin typeface="Cambria Math" panose="02040503050406030204" pitchFamily="18" charset="0"/>
                                   </a:rPr>
                                   <m:t>𝑌</m:t>
@@ -10633,6 +11802,9 @@
                               <m:sub>
                                 <m:r>
                                   <a:rPr lang="en-US" i="1">
+                                    <a:solidFill>
+                                      <a:schemeClr val="tx1"/>
+                                    </a:solidFill>
                                     <a:latin typeface="Cambria Math" panose="02040503050406030204" pitchFamily="18" charset="0"/>
                                   </a:rPr>
                                   <m:t>𝑖</m:t>
@@ -10641,6 +11813,9 @@
                             </m:sSub>
                             <m:r>
                               <a:rPr lang="en-US" i="1">
+                                <a:solidFill>
+                                  <a:schemeClr val="tx1"/>
+                                </a:solidFill>
                                 <a:latin typeface="Cambria Math" panose="02040503050406030204" pitchFamily="18" charset="0"/>
                               </a:rPr>
                               <m:t>−</m:t>
@@ -10649,6 +11824,9 @@
                               <m:sSubPr>
                                 <m:ctrlPr>
                                   <a:rPr lang="en-US" i="1">
+                                    <a:solidFill>
+                                      <a:schemeClr val="tx1"/>
+                                    </a:solidFill>
                                     <a:latin typeface="Cambria Math" panose="02040503050406030204" pitchFamily="18" charset="0"/>
                                   </a:rPr>
                                 </m:ctrlPr>
@@ -10659,6 +11837,9 @@
                                     <m:chr m:val="̂"/>
                                     <m:ctrlPr>
                                       <a:rPr lang="en-US" i="1">
+                                        <a:solidFill>
+                                          <a:schemeClr val="tx1"/>
+                                        </a:solidFill>
                                         <a:latin typeface="Cambria Math" panose="02040503050406030204" pitchFamily="18" charset="0"/>
                                       </a:rPr>
                                     </m:ctrlPr>
@@ -10666,6 +11847,9 @@
                                   <m:e>
                                     <m:r>
                                       <a:rPr lang="en-US" i="1">
+                                        <a:solidFill>
+                                          <a:schemeClr val="tx1"/>
+                                        </a:solidFill>
                                         <a:latin typeface="Cambria Math" panose="02040503050406030204" pitchFamily="18" charset="0"/>
                                       </a:rPr>
                                       <m:t>𝑌</m:t>
@@ -10676,6 +11860,9 @@
                               <m:sub>
                                 <m:r>
                                   <a:rPr lang="en-US" i="1">
+                                    <a:solidFill>
+                                      <a:schemeClr val="tx1"/>
+                                    </a:solidFill>
                                     <a:latin typeface="Cambria Math" panose="02040503050406030204" pitchFamily="18" charset="0"/>
                                   </a:rPr>
                                   <m:t>𝑖</m:t>
@@ -10684,6 +11871,9 @@
                             </m:sSub>
                             <m:r>
                               <a:rPr lang="en-US" i="1">
+                                <a:solidFill>
+                                  <a:schemeClr val="tx1"/>
+                                </a:solidFill>
                                 <a:latin typeface="Cambria Math" panose="02040503050406030204" pitchFamily="18" charset="0"/>
                               </a:rPr>
                               <m:t>)</m:t>
@@ -10692,6 +11882,9 @@
                           <m:sup>
                             <m:r>
                               <a:rPr lang="en-US" i="1">
+                                <a:solidFill>
+                                  <a:schemeClr val="tx1"/>
+                                </a:solidFill>
                                 <a:latin typeface="Cambria Math" panose="02040503050406030204" pitchFamily="18" charset="0"/>
                               </a:rPr>
                               <m:t>2</m:t>
@@ -10702,12 +11895,16 @@
                     </m:nary>
                   </m:oMath>
                 </a14:m>
-                <a:endParaRPr lang="en-US" dirty="0"/>
+                <a:endParaRPr lang="en-US" dirty="0">
+                  <a:solidFill>
+                    <a:schemeClr val="tx1"/>
+                  </a:solidFill>
+                </a:endParaRPr>
               </a:p>
             </p:txBody>
           </p:sp>
         </mc:Choice>
-        <mc:Fallback xmlns="">
+        <mc:Fallback>
           <p:sp>
             <p:nvSpPr>
               <p:cNvPr id="3" name="Content Placeholder 2"/>
@@ -10720,7 +11917,7 @@
             </p:nvSpPr>
             <p:spPr>
               <a:blipFill>
-                <a:blip r:embed="rId2"/>
+                <a:blip r:embed="rId3"/>
                 <a:stretch>
                   <a:fillRect l="-1777" t="-2941"/>
                 </a:stretch>
@@ -10774,12 +11971,12 @@
   <p:clrMapOvr>
     <a:masterClrMapping/>
   </p:clrMapOvr>
-  <mc:AlternateContent xmlns:mc="http://schemas.openxmlformats.org/markup-compatibility/2006" xmlns:p14="http://schemas.microsoft.com/office/powerpoint/2010/main">
-    <mc:Choice Requires="p14">
-      <p:transition p14:dur="0" advClick="0" advTm="15000"/>
+  <mc:AlternateContent xmlns:mc="http://schemas.openxmlformats.org/markup-compatibility/2006">
+    <mc:Choice xmlns:p14="http://schemas.microsoft.com/office/powerpoint/2010/main" Requires="p14">
+      <p:transition p14:dur="0" advClick="0" advTm="45000"/>
     </mc:Choice>
-    <mc:Fallback xmlns="">
-      <p:transition advClick="0" advTm="15000"/>
+    <mc:Fallback>
+      <p:transition advClick="0" advTm="45000"/>
     </mc:Fallback>
   </mc:AlternateContent>
 </p:sld>
@@ -13117,11 +14314,11 @@
   <p:clrMapOvr>
     <a:masterClrMapping/>
   </p:clrMapOvr>
-  <mc:AlternateContent xmlns:mc="http://schemas.openxmlformats.org/markup-compatibility/2006">
-    <mc:Choice xmlns:p14="http://schemas.microsoft.com/office/powerpoint/2010/main" Requires="p14">
+  <mc:AlternateContent xmlns:mc="http://schemas.openxmlformats.org/markup-compatibility/2006" xmlns:p14="http://schemas.microsoft.com/office/powerpoint/2010/main">
+    <mc:Choice Requires="p14">
       <p:transition p14:dur="0" advClick="0" advTm="15000"/>
     </mc:Choice>
-    <mc:Fallback>
+    <mc:Fallback xmlns="">
       <p:transition advClick="0" advTm="15000"/>
     </mc:Fallback>
   </mc:AlternateContent>
@@ -13184,7 +14381,7 @@
           </p:nvPr>
         </p:nvPicPr>
         <p:blipFill>
-          <a:blip r:embed="rId2"/>
+          <a:blip r:embed="rId3"/>
           <a:stretch>
             <a:fillRect/>
           </a:stretch>
@@ -13237,7 +14434,7 @@
           <p:nvPr/>
         </p:nvPicPr>
         <p:blipFill>
-          <a:blip r:embed="rId3"/>
+          <a:blip r:embed="rId4"/>
           <a:stretch>
             <a:fillRect/>
           </a:stretch>
@@ -13267,7 +14464,7 @@
           <p:nvPr/>
         </p:nvPicPr>
         <p:blipFill>
-          <a:blip r:embed="rId4"/>
+          <a:blip r:embed="rId5"/>
           <a:stretch>
             <a:fillRect/>
           </a:stretch>
@@ -13480,7 +14677,7 @@
             </a:pPr>
             <a:r>
               <a:rPr lang="en-US" sz="800">
-                <a:hlinkClick r:id="rId5"/>
+                <a:hlinkClick r:id="rId6"/>
               </a:rPr>
               <a:t>https://ya-webdesign.com/imgdownload.html</a:t>
             </a:r>
@@ -13536,19 +14733,19 @@
   <p:clrMapOvr>
     <a:masterClrMapping/>
   </p:clrMapOvr>
-  <mc:AlternateContent xmlns:mc="http://schemas.openxmlformats.org/markup-compatibility/2006" xmlns:p14="http://schemas.microsoft.com/office/powerpoint/2010/main">
-    <mc:Choice Requires="p14">
-      <p:transition p14:dur="0" advClick="0" advTm="15000"/>
+  <mc:AlternateContent xmlns:mc="http://schemas.openxmlformats.org/markup-compatibility/2006">
+    <mc:Choice xmlns:p14="http://schemas.microsoft.com/office/powerpoint/2010/main" Requires="p14">
+      <p:transition p14:dur="10" advClick="0" advTm="30000"/>
     </mc:Choice>
-    <mc:Fallback xmlns="">
-      <p:transition advClick="0" advTm="15000"/>
+    <mc:Fallback>
+      <p:transition advClick="0" advTm="30000"/>
     </mc:Fallback>
   </mc:AlternateContent>
 </p:sld>
 </file>
 
 <file path=ppt/slides/slide9.xml><?xml version="1.0" encoding="utf-8"?>
-<p:sld xmlns:a="http://schemas.openxmlformats.org/drawingml/2006/main" xmlns:r="http://schemas.openxmlformats.org/officeDocument/2006/relationships" xmlns:p="http://schemas.openxmlformats.org/presentationml/2006/main">
+<p:sld xmlns:a="http://schemas.openxmlformats.org/drawingml/2006/main" xmlns:r="http://schemas.openxmlformats.org/officeDocument/2006/relationships" xmlns:p="http://schemas.openxmlformats.org/presentationml/2006/main" show="0">
   <p:cSld>
     <p:spTree>
       <p:nvGrpSpPr>
@@ -13685,11 +14882,11 @@
   <p:clrMapOvr>
     <a:masterClrMapping/>
   </p:clrMapOvr>
-  <mc:AlternateContent xmlns:mc="http://schemas.openxmlformats.org/markup-compatibility/2006" xmlns:p14="http://schemas.microsoft.com/office/powerpoint/2010/main">
-    <mc:Choice Requires="p14">
+  <mc:AlternateContent xmlns:mc="http://schemas.openxmlformats.org/markup-compatibility/2006">
+    <mc:Choice xmlns:p14="http://schemas.microsoft.com/office/powerpoint/2010/main" Requires="p14">
       <p:transition p14:dur="0" advClick="0" advTm="15000"/>
     </mc:Choice>
-    <mc:Fallback xmlns="">
+    <mc:Fallback>
       <p:transition advClick="0" advTm="15000"/>
     </mc:Fallback>
   </mc:AlternateContent>

</xml_diff>